<commit_message>
Fix population in geonames
</commit_message>
<xml_diff>
--- a/FloodMappingWorkshop.pptx
+++ b/FloodMappingWorkshop.pptx
@@ -227,7 +227,7 @@
           <a:p>
             <a:fld id="{6AEAE0EB-25CF-2F46-843C-1A0CFED83F3C}" type="datetimeFigureOut">
               <a:rPr lang="en-US" smtClean="0"/>
-              <a:t>9/17/14</a:t>
+              <a:t>9/18/14</a:t>
             </a:fld>
             <a:endParaRPr lang="en-US"/>
           </a:p>
@@ -393,7 +393,7 @@
           <a:p>
             <a:fld id="{37762B48-3789-7C45-9DAE-CD684899197F}" type="datetimeFigureOut">
               <a:rPr lang="en-US" smtClean="0"/>
-              <a:t>9/17/14</a:t>
+              <a:t>9/18/14</a:t>
             </a:fld>
             <a:endParaRPr lang="en-US"/>
           </a:p>
@@ -843,7 +843,7 @@
           <a:p>
             <a:fld id="{782C590E-73E6-BE4C-8D17-32B84AC12780}" type="datetime1">
               <a:rPr lang="en-US" smtClean="0"/>
-              <a:t>9/17/14</a:t>
+              <a:t>9/18/14</a:t>
             </a:fld>
             <a:endParaRPr lang="en-US"/>
           </a:p>
@@ -1013,7 +1013,7 @@
           <a:p>
             <a:fld id="{62A5A434-B217-3043-9FB0-91DFE224FB01}" type="datetime1">
               <a:rPr lang="en-US" smtClean="0"/>
-              <a:t>9/17/14</a:t>
+              <a:t>9/18/14</a:t>
             </a:fld>
             <a:endParaRPr lang="en-US"/>
           </a:p>
@@ -1193,7 +1193,7 @@
           <a:p>
             <a:fld id="{53968034-2EFD-7D4F-993E-D3A003C8BD11}" type="datetime1">
               <a:rPr lang="en-US" smtClean="0"/>
-              <a:t>9/17/14</a:t>
+              <a:t>9/18/14</a:t>
             </a:fld>
             <a:endParaRPr lang="en-US"/>
           </a:p>
@@ -1363,7 +1363,7 @@
           <a:p>
             <a:fld id="{B96177CD-2479-6842-BB82-2B2C44E50D47}" type="datetime1">
               <a:rPr lang="en-US" smtClean="0"/>
-              <a:t>9/17/14</a:t>
+              <a:t>9/18/14</a:t>
             </a:fld>
             <a:endParaRPr lang="en-US"/>
           </a:p>
@@ -1609,7 +1609,7 @@
           <a:p>
             <a:fld id="{3F2555FD-18D1-2643-AB9E-55E248901A68}" type="datetime1">
               <a:rPr lang="en-US" smtClean="0"/>
-              <a:t>9/17/14</a:t>
+              <a:t>9/18/14</a:t>
             </a:fld>
             <a:endParaRPr lang="en-US"/>
           </a:p>
@@ -1897,7 +1897,7 @@
           <a:p>
             <a:fld id="{0AC77C15-3837-304F-AEA1-ADC2CE3CD97D}" type="datetime1">
               <a:rPr lang="en-US" smtClean="0"/>
-              <a:t>9/17/14</a:t>
+              <a:t>9/18/14</a:t>
             </a:fld>
             <a:endParaRPr lang="en-US"/>
           </a:p>
@@ -2319,7 +2319,7 @@
           <a:p>
             <a:fld id="{519ED786-5B7C-B746-963E-20BE429A27AB}" type="datetime1">
               <a:rPr lang="en-US" smtClean="0"/>
-              <a:t>9/17/14</a:t>
+              <a:t>9/18/14</a:t>
             </a:fld>
             <a:endParaRPr lang="en-US"/>
           </a:p>
@@ -2437,7 +2437,7 @@
           <a:p>
             <a:fld id="{1A9C2FAC-F4B8-9A46-B70E-D63E2DA89B64}" type="datetime1">
               <a:rPr lang="en-US" smtClean="0"/>
-              <a:t>9/17/14</a:t>
+              <a:t>9/18/14</a:t>
             </a:fld>
             <a:endParaRPr lang="en-US"/>
           </a:p>
@@ -2532,7 +2532,7 @@
           <a:p>
             <a:fld id="{79506D41-9135-5E49-A615-CFE82CA54C9F}" type="datetime1">
               <a:rPr lang="en-US" smtClean="0"/>
-              <a:t>9/17/14</a:t>
+              <a:t>9/18/14</a:t>
             </a:fld>
             <a:endParaRPr lang="en-US"/>
           </a:p>
@@ -2809,7 +2809,7 @@
           <a:p>
             <a:fld id="{46A5204B-8A87-D642-B331-44BEE290161B}" type="datetime1">
               <a:rPr lang="en-US" smtClean="0"/>
-              <a:t>9/17/14</a:t>
+              <a:t>9/18/14</a:t>
             </a:fld>
             <a:endParaRPr lang="en-US"/>
           </a:p>
@@ -3062,7 +3062,7 @@
           <a:p>
             <a:fld id="{162405E3-367C-264F-A8DB-24E665D4FE9E}" type="datetime1">
               <a:rPr lang="en-US" smtClean="0"/>
-              <a:t>9/17/14</a:t>
+              <a:t>9/18/14</a:t>
             </a:fld>
             <a:endParaRPr lang="en-US"/>
           </a:p>
@@ -3275,7 +3275,7 @@
           <a:p>
             <a:fld id="{11793064-3227-5A47-B9A6-3A5D78D09B8E}" type="datetime1">
               <a:rPr lang="en-US" smtClean="0"/>
-              <a:t>9/17/14</a:t>
+              <a:t>9/18/14</a:t>
             </a:fld>
             <a:endParaRPr lang="en-US"/>
           </a:p>
@@ -12557,14 +12557,14 @@
           <p:nvPr>
             <p:extLst>
               <p:ext uri="{D42A27DB-BD31-4B8C-83A1-F6EECF244321}">
-                <p14:modId xmlns:p14="http://schemas.microsoft.com/office/powerpoint/2010/main" val="749751707"/>
+                <p14:modId xmlns:p14="http://schemas.microsoft.com/office/powerpoint/2010/main" val="1236958142"/>
               </p:ext>
             </p:extLst>
           </p:nvPr>
         </p:nvGraphicFramePr>
         <p:xfrm>
           <a:off x="363104" y="1176580"/>
-          <a:ext cx="8573454" cy="5051430"/>
+          <a:ext cx="8573454" cy="4972299"/>
         </p:xfrm>
         <a:graphic>
           <a:graphicData uri="http://schemas.openxmlformats.org/drawingml/2006/table">
@@ -12693,11 +12693,35 @@
                     <a:bodyPr/>
                     <a:lstStyle/>
                     <a:p>
+                      <a:pPr marL="0" marR="0" indent="0" algn="l" defTabSz="457200" rtl="0" eaLnBrk="1" fontAlgn="auto" latinLnBrk="0" hangingPunct="1">
+                        <a:lnSpc>
+                          <a:spcPct val="100000"/>
+                        </a:lnSpc>
+                        <a:spcBef>
+                          <a:spcPts val="0"/>
+                        </a:spcBef>
+                        <a:spcAft>
+                          <a:spcPts val="0"/>
+                        </a:spcAft>
+                        <a:buClrTx/>
+                        <a:buSzTx/>
+                        <a:buFontTx/>
+                        <a:buNone/>
+                        <a:tabLst/>
+                        <a:defRPr/>
+                      </a:pPr>
                       <a:r>
-                        <a:rPr lang="en-US" dirty="0" smtClean="0"/>
-                        <a:t>UNIV Alabama Huntsville</a:t>
+                        <a:rPr lang="en-US" sz="1800" kern="1200" dirty="0" smtClean="0">
+                          <a:solidFill>
+                            <a:schemeClr val="dk1"/>
+                          </a:solidFill>
+                          <a:latin typeface="+mn-lt"/>
+                          <a:ea typeface="+mn-ea"/>
+                          <a:cs typeface="+mn-cs"/>
+                        </a:rPr>
+                        <a:t>NASA/MSFC/UAH</a:t>
                       </a:r>
-                      <a:endParaRPr lang="en-US" dirty="0"/>
+                      <a:endParaRPr lang="en-US" dirty="0" smtClean="0"/>
                     </a:p>
                   </a:txBody>
                   <a:tcPr/>
@@ -12755,9 +12779,17 @@
                         <a:defRPr/>
                       </a:pPr>
                       <a:r>
-                        <a:rPr lang="en-US" dirty="0" smtClean="0"/>
-                        <a:t>UNIV Alabama Huntsville</a:t>
+                        <a:rPr lang="en-US" sz="1800" kern="1200" dirty="0" smtClean="0">
+                          <a:solidFill>
+                            <a:schemeClr val="dk1"/>
+                          </a:solidFill>
+                          <a:latin typeface="+mn-lt"/>
+                          <a:ea typeface="+mn-ea"/>
+                          <a:cs typeface="+mn-cs"/>
+                        </a:rPr>
+                        <a:t>NASA/MSFC/UAH</a:t>
                       </a:r>
+                      <a:endParaRPr lang="en-US" dirty="0" smtClean="0"/>
                     </a:p>
                   </a:txBody>
                   <a:tcPr/>
@@ -12797,7 +12829,11 @@
                     <a:bodyPr/>
                     <a:lstStyle/>
                     <a:p>
-                      <a:endParaRPr lang="en-US"/>
+                      <a:r>
+                        <a:rPr lang="en-US" dirty="0" smtClean="0"/>
+                        <a:t>Kris Stanton</a:t>
+                      </a:r>
+                      <a:endParaRPr lang="en-US" dirty="0"/>
                     </a:p>
                   </a:txBody>
                   <a:tcPr/>
@@ -12807,7 +12843,18 @@
                     <a:bodyPr/>
                     <a:lstStyle/>
                     <a:p>
-                      <a:endParaRPr lang="en-US"/>
+                      <a:r>
+                        <a:rPr lang="en-US" sz="1800" kern="1200" dirty="0" smtClean="0">
+                          <a:solidFill>
+                            <a:schemeClr val="dk1"/>
+                          </a:solidFill>
+                          <a:latin typeface="+mn-lt"/>
+                          <a:ea typeface="+mn-ea"/>
+                          <a:cs typeface="+mn-cs"/>
+                        </a:rPr>
+                        <a:t>NASA/MSFC/USRA</a:t>
+                      </a:r>
+                      <a:endParaRPr lang="en-US" dirty="0"/>
                     </a:p>
                   </a:txBody>
                   <a:tcPr/>
@@ -12817,7 +12864,25 @@
                     <a:bodyPr/>
                     <a:lstStyle/>
                     <a:p>
-                      <a:endParaRPr lang="en-US"/>
+                      <a:r>
+                        <a:rPr lang="en-US" sz="1800" b="0" u="sng" kern="1200" dirty="0" err="1" smtClean="0">
+                          <a:solidFill>
+                            <a:schemeClr val="dk1"/>
+                          </a:solidFill>
+                          <a:effectLst/>
+                          <a:latin typeface="+mn-lt"/>
+                          <a:ea typeface="+mn-ea"/>
+                          <a:cs typeface="+mn-cs"/>
+                        </a:rPr>
+                        <a:t>kris.stanton@nasa.gov</a:t>
+                      </a:r>
+                      <a:r>
+                        <a:rPr lang="en-US" b="0" dirty="0" smtClean="0">
+                          <a:effectLst/>
+                        </a:rPr>
+                        <a:t> </a:t>
+                      </a:r>
+                      <a:endParaRPr lang="en-US" b="0" dirty="0"/>
                     </a:p>
                   </a:txBody>
                   <a:tcPr/>
@@ -12829,7 +12894,11 @@
                     <a:bodyPr/>
                     <a:lstStyle/>
                     <a:p>
-                      <a:endParaRPr lang="en-US"/>
+                      <a:r>
+                        <a:rPr lang="en-US" dirty="0" smtClean="0"/>
+                        <a:t>Francis Delgado</a:t>
+                      </a:r>
+                      <a:endParaRPr lang="en-US" dirty="0"/>
                     </a:p>
                   </a:txBody>
                   <a:tcPr/>
@@ -12839,7 +12908,18 @@
                     <a:bodyPr/>
                     <a:lstStyle/>
                     <a:p>
-                      <a:endParaRPr lang="en-US"/>
+                      <a:r>
+                        <a:rPr lang="en-US" sz="1800" kern="1200" dirty="0" smtClean="0">
+                          <a:solidFill>
+                            <a:schemeClr val="dk1"/>
+                          </a:solidFill>
+                          <a:latin typeface="+mn-lt"/>
+                          <a:ea typeface="+mn-ea"/>
+                          <a:cs typeface="+mn-cs"/>
+                        </a:rPr>
+                        <a:t>NASA/MSFC/USRA</a:t>
+                      </a:r>
+                      <a:endParaRPr lang="en-US" dirty="0"/>
                     </a:p>
                   </a:txBody>
                   <a:tcPr/>
@@ -12849,7 +12929,25 @@
                     <a:bodyPr/>
                     <a:lstStyle/>
                     <a:p>
-                      <a:endParaRPr lang="en-US"/>
+                      <a:r>
+                        <a:rPr lang="en-US" sz="1800" b="0" u="sng" kern="1200" dirty="0" err="1" smtClean="0">
+                          <a:solidFill>
+                            <a:schemeClr val="dk1"/>
+                          </a:solidFill>
+                          <a:effectLst/>
+                          <a:latin typeface="+mn-lt"/>
+                          <a:ea typeface="+mn-ea"/>
+                          <a:cs typeface="+mn-cs"/>
+                        </a:rPr>
+                        <a:t>francisco.delgadoolivares@nasa.gov</a:t>
+                      </a:r>
+                      <a:r>
+                        <a:rPr lang="en-US" b="0" dirty="0" smtClean="0">
+                          <a:effectLst/>
+                        </a:rPr>
+                        <a:t> </a:t>
+                      </a:r>
+                      <a:endParaRPr lang="en-US" b="0" dirty="0"/>
                     </a:p>
                   </a:txBody>
                   <a:tcPr/>
@@ -12861,6 +12959,14 @@
                     <a:bodyPr/>
                     <a:lstStyle/>
                     <a:p>
+                      <a:r>
+                        <a:rPr lang="en-US" dirty="0" smtClean="0"/>
+                        <a:t>Billy </a:t>
+                      </a:r>
+                      <a:r>
+                        <a:rPr lang="en-US" smtClean="0"/>
+                        <a:t>Ashmall</a:t>
+                      </a:r>
                       <a:endParaRPr lang="en-US"/>
                     </a:p>
                   </a:txBody>
@@ -12871,7 +12977,18 @@
                     <a:bodyPr/>
                     <a:lstStyle/>
                     <a:p>
-                      <a:endParaRPr lang="en-US"/>
+                      <a:r>
+                        <a:rPr lang="en-US" sz="1800" kern="1200" dirty="0" smtClean="0">
+                          <a:solidFill>
+                            <a:schemeClr val="dk1"/>
+                          </a:solidFill>
+                          <a:latin typeface="+mn-lt"/>
+                          <a:ea typeface="+mn-ea"/>
+                          <a:cs typeface="+mn-cs"/>
+                        </a:rPr>
+                        <a:t>NASA/MSFC/USRA</a:t>
+                      </a:r>
+                      <a:endParaRPr lang="en-US" dirty="0"/>
                     </a:p>
                   </a:txBody>
                   <a:tcPr/>
@@ -12881,7 +12998,27 @@
                     <a:bodyPr/>
                     <a:lstStyle/>
                     <a:p>
-                      <a:endParaRPr lang="en-US"/>
+                      <a:r>
+                        <a:rPr lang="en-US" sz="1800" b="0" u="sng" kern="1200" dirty="0" err="1" smtClean="0">
+                          <a:solidFill>
+                            <a:schemeClr val="dk1"/>
+                          </a:solidFill>
+                          <a:effectLst/>
+                          <a:latin typeface="+mn-lt"/>
+                          <a:ea typeface="+mn-ea"/>
+                          <a:cs typeface="+mn-cs"/>
+                        </a:rPr>
+                        <a:t>billy.ashmall@nasa.gov</a:t>
+                      </a:r>
+                      <a:endParaRPr lang="en-US" sz="1800" b="0" kern="1200" dirty="0">
+                        <a:solidFill>
+                          <a:schemeClr val="dk1"/>
+                        </a:solidFill>
+                        <a:effectLst/>
+                        <a:latin typeface="+mn-lt"/>
+                        <a:ea typeface="+mn-ea"/>
+                        <a:cs typeface="+mn-cs"/>
+                      </a:endParaRPr>
                     </a:p>
                   </a:txBody>
                   <a:tcPr/>
@@ -12893,7 +13030,29 @@
                     <a:bodyPr/>
                     <a:lstStyle/>
                     <a:p>
-                      <a:endParaRPr lang="en-US"/>
+                      <a:r>
+                        <a:rPr lang="en-US" sz="1800" kern="1200" dirty="0" smtClean="0">
+                          <a:solidFill>
+                            <a:schemeClr val="dk1"/>
+                          </a:solidFill>
+                          <a:latin typeface="+mn-lt"/>
+                          <a:ea typeface="+mn-ea"/>
+                          <a:cs typeface="+mn-cs"/>
+                        </a:rPr>
+                        <a:t>Anastasia </a:t>
+                      </a:r>
+                      <a:r>
+                        <a:rPr lang="en-US" sz="1800" kern="1200" dirty="0" err="1" smtClean="0">
+                          <a:solidFill>
+                            <a:schemeClr val="dk1"/>
+                          </a:solidFill>
+                          <a:latin typeface="+mn-lt"/>
+                          <a:ea typeface="+mn-ea"/>
+                          <a:cs typeface="+mn-cs"/>
+                        </a:rPr>
+                        <a:t>Wahome</a:t>
+                      </a:r>
+                      <a:endParaRPr lang="en-US" dirty="0"/>
                     </a:p>
                   </a:txBody>
                   <a:tcPr/>
@@ -12903,7 +13062,18 @@
                     <a:bodyPr/>
                     <a:lstStyle/>
                     <a:p>
-                      <a:endParaRPr lang="en-US"/>
+                      <a:r>
+                        <a:rPr lang="en-US" sz="1800" kern="1200" dirty="0" smtClean="0">
+                          <a:solidFill>
+                            <a:schemeClr val="dk1"/>
+                          </a:solidFill>
+                          <a:latin typeface="+mn-lt"/>
+                          <a:ea typeface="+mn-ea"/>
+                          <a:cs typeface="+mn-cs"/>
+                        </a:rPr>
+                        <a:t>RCMRD</a:t>
+                      </a:r>
+                      <a:endParaRPr lang="en-US" dirty="0"/>
                     </a:p>
                   </a:txBody>
                   <a:tcPr/>
@@ -12913,7 +13083,19 @@
                     <a:bodyPr/>
                     <a:lstStyle/>
                     <a:p>
-                      <a:endParaRPr lang="en-US"/>
+                      <a:r>
+                        <a:rPr lang="en-US" sz="1800" u="sng" kern="1200" dirty="0" smtClean="0">
+                          <a:solidFill>
+                            <a:schemeClr val="dk1"/>
+                          </a:solidFill>
+                          <a:latin typeface="+mn-lt"/>
+                          <a:ea typeface="+mn-ea"/>
+                          <a:cs typeface="+mn-cs"/>
+                          <a:hlinkClick r:id="rId2"/>
+                        </a:rPr>
+                        <a:t>awahome@rcmrd.org</a:t>
+                      </a:r>
+                      <a:endParaRPr lang="en-US" dirty="0"/>
                     </a:p>
                   </a:txBody>
                   <a:tcPr/>
@@ -12925,7 +13107,29 @@
                     <a:bodyPr/>
                     <a:lstStyle/>
                     <a:p>
-                      <a:endParaRPr lang="en-US"/>
+                      <a:r>
+                        <a:rPr lang="en-US" sz="1800" kern="1200" dirty="0" smtClean="0">
+                          <a:solidFill>
+                            <a:schemeClr val="dk1"/>
+                          </a:solidFill>
+                          <a:latin typeface="+mn-lt"/>
+                          <a:ea typeface="+mn-ea"/>
+                          <a:cs typeface="+mn-cs"/>
+                        </a:rPr>
+                        <a:t>Faith </a:t>
+                      </a:r>
+                      <a:r>
+                        <a:rPr lang="en-US" sz="1800" kern="1200" dirty="0" err="1" smtClean="0">
+                          <a:solidFill>
+                            <a:schemeClr val="dk1"/>
+                          </a:solidFill>
+                          <a:latin typeface="+mn-lt"/>
+                          <a:ea typeface="+mn-ea"/>
+                          <a:cs typeface="+mn-cs"/>
+                        </a:rPr>
+                        <a:t>Mitheu</a:t>
+                      </a:r>
+                      <a:endParaRPr lang="en-US" dirty="0"/>
                     </a:p>
                   </a:txBody>
                   <a:tcPr/>
@@ -12935,7 +13139,11 @@
                     <a:bodyPr/>
                     <a:lstStyle/>
                     <a:p>
-                      <a:endParaRPr lang="en-US"/>
+                      <a:r>
+                        <a:rPr lang="en-US" dirty="0" smtClean="0"/>
+                        <a:t>RCMRD</a:t>
+                      </a:r>
+                      <a:endParaRPr lang="en-US" dirty="0"/>
                     </a:p>
                   </a:txBody>
                   <a:tcPr/>
@@ -12945,7 +13153,19 @@
                     <a:bodyPr/>
                     <a:lstStyle/>
                     <a:p>
-                      <a:endParaRPr lang="en-US"/>
+                      <a:r>
+                        <a:rPr lang="en-US" sz="1800" u="sng" kern="1200" dirty="0" smtClean="0">
+                          <a:solidFill>
+                            <a:schemeClr val="dk1"/>
+                          </a:solidFill>
+                          <a:latin typeface="+mn-lt"/>
+                          <a:ea typeface="+mn-ea"/>
+                          <a:cs typeface="+mn-cs"/>
+                          <a:hlinkClick r:id="rId3"/>
+                        </a:rPr>
+                        <a:t>fmitheu@rcmrd.org</a:t>
+                      </a:r>
+                      <a:endParaRPr lang="en-US" dirty="0"/>
                     </a:p>
                   </a:txBody>
                   <a:tcPr/>
@@ -12957,7 +13177,29 @@
                     <a:bodyPr/>
                     <a:lstStyle/>
                     <a:p>
-                      <a:endParaRPr lang="en-US"/>
+                      <a:r>
+                        <a:rPr lang="en-US" sz="1800" kern="1200" dirty="0" smtClean="0">
+                          <a:solidFill>
+                            <a:schemeClr val="dk1"/>
+                          </a:solidFill>
+                          <a:latin typeface="+mn-lt"/>
+                          <a:ea typeface="+mn-ea"/>
+                          <a:cs typeface="+mn-cs"/>
+                        </a:rPr>
+                        <a:t>Denis </a:t>
+                      </a:r>
+                      <a:r>
+                        <a:rPr lang="en-US" sz="1800" kern="1200" dirty="0" err="1" smtClean="0">
+                          <a:solidFill>
+                            <a:schemeClr val="dk1"/>
+                          </a:solidFill>
+                          <a:latin typeface="+mn-lt"/>
+                          <a:ea typeface="+mn-ea"/>
+                          <a:cs typeface="+mn-cs"/>
+                        </a:rPr>
+                        <a:t>Macharia</a:t>
+                      </a:r>
+                      <a:endParaRPr lang="en-US" dirty="0"/>
                     </a:p>
                   </a:txBody>
                   <a:tcPr/>
@@ -12967,7 +13209,11 @@
                     <a:bodyPr/>
                     <a:lstStyle/>
                     <a:p>
-                      <a:endParaRPr lang="en-US"/>
+                      <a:r>
+                        <a:rPr lang="en-US" dirty="0" smtClean="0"/>
+                        <a:t>RCMRD</a:t>
+                      </a:r>
+                      <a:endParaRPr lang="en-US" dirty="0"/>
                     </a:p>
                   </a:txBody>
                   <a:tcPr/>
@@ -12977,6 +13223,18 @@
                     <a:bodyPr/>
                     <a:lstStyle/>
                     <a:p>
+                      <a:r>
+                        <a:rPr lang="en-US" sz="1800" u="sng" kern="1200" dirty="0" smtClean="0">
+                          <a:solidFill>
+                            <a:schemeClr val="dk1"/>
+                          </a:solidFill>
+                          <a:latin typeface="+mn-lt"/>
+                          <a:ea typeface="+mn-ea"/>
+                          <a:cs typeface="+mn-cs"/>
+                          <a:hlinkClick r:id="rId4"/>
+                        </a:rPr>
+                        <a:t>dmacharia@rcmrd.org</a:t>
+                      </a:r>
                       <a:endParaRPr lang="en-US" dirty="0"/>
                     </a:p>
                   </a:txBody>
@@ -14595,13 +14853,7 @@
               <a:rPr lang="en-US" sz="1200" dirty="0" smtClean="0">
                 <a:cs typeface="Courier"/>
               </a:rPr>
-              <a:t>Algorithm uses </a:t>
-            </a:r>
-            <a:r>
-              <a:rPr lang="en-US" sz="1200" dirty="0" smtClean="0">
-                <a:cs typeface="Courier"/>
-              </a:rPr>
-              <a:t>MNDWI and TOA</a:t>
+              <a:t>Algorithm uses MNDWI and TOA</a:t>
             </a:r>
           </a:p>
           <a:p>
@@ -14647,13 +14899,7 @@
               <a:rPr lang="en-US" sz="1200" dirty="0" smtClean="0">
                 <a:cs typeface="Courier"/>
               </a:rPr>
-              <a:t>Results could be improved with Atmospheric Correction and Co-</a:t>
-            </a:r>
-            <a:r>
-              <a:rPr lang="en-US" sz="1200" dirty="0" smtClean="0">
-                <a:cs typeface="Courier"/>
-              </a:rPr>
-              <a:t>Registration</a:t>
+              <a:t>Results could be improved with Atmospheric Correction and Co-Registration</a:t>
             </a:r>
           </a:p>
           <a:p>

</xml_diff>